<commit_message>
Added notes to slides
</commit_message>
<xml_diff>
--- a/AS712_Presentation.pptx
+++ b/AS712_Presentation.pptx
@@ -224,7 +224,7 @@
           <a:p>
             <a:fld id="{1F382995-B617-4EB8-8DD8-EE72513BDA77}" type="datetimeFigureOut">
               <a:rPr lang="en-US" smtClean="0"/>
-              <a:t>12/12/2015</a:t>
+              <a:t>12/13/2015</a:t>
             </a:fld>
             <a:endParaRPr lang="en-US"/>
           </a:p>
@@ -536,6 +536,40 @@
           <a:bodyPr/>
           <a:lstStyle/>
           <a:p>
+            <a:r>
+              <a:rPr lang="en-US" dirty="0" smtClean="0"/>
+              <a:t>There are three main components to creating</a:t>
+            </a:r>
+            <a:r>
+              <a:rPr lang="en-US" baseline="0" dirty="0" smtClean="0"/>
+              <a:t> a neural network. The first is to set up the network. This requires determining what form your input will take, how the network should be defined, and what form your output should take. Care must be taken here as you can achieve vastly different results by properly structuring the network. For example, creating a network for logic gates is discussed throughout this </a:t>
+            </a:r>
+            <a:r>
+              <a:rPr lang="en-US" baseline="0" dirty="0" err="1" smtClean="0"/>
+              <a:t>powerpoint</a:t>
+            </a:r>
+            <a:r>
+              <a:rPr lang="en-US" baseline="0" dirty="0" smtClean="0"/>
+              <a:t>. You’ll notice that True and False are converted into 1 and -1 respectively. This is a better choice than using 1 and 0 and will result in more accurate neural networks. What’s more, the choice of the number and size of hidden layers and the sigmoidal function used is important.</a:t>
+            </a:r>
+          </a:p>
+          <a:p>
+            <a:endParaRPr lang="en-US" baseline="0" dirty="0" smtClean="0"/>
+          </a:p>
+          <a:p>
+            <a:r>
+              <a:rPr lang="en-US" baseline="0" dirty="0" smtClean="0"/>
+              <a:t>The next step is to train your network. For the most part, this will involve a process known as supervised learning (unsupervised learning is super hard to do) where you feed in data to the neural network and have it try to determine an answer. You will know the correct answer and can implement a standard procedure for “correcting” the network if it happens to be wrong. One such common correction method is known as back-propagation. A word of caution though, you should not over-train your neural network as you can end up training it to only be good at your training set of data and not be good at more general data. Over-training is akin to using a 20-degree polynomial to fit 20 data points rather than fitting a simpler function to it. While that 20-degree polynomial might exactly hit all your points, it is probably not the best function to fit that and other data.</a:t>
+            </a:r>
+          </a:p>
+          <a:p>
+            <a:endParaRPr lang="en-US" baseline="0" dirty="0" smtClean="0"/>
+          </a:p>
+          <a:p>
+            <a:r>
+              <a:rPr lang="en-US" baseline="0" dirty="0" smtClean="0"/>
+              <a:t>The last step is to finally test your network once it has been fully trained and has “learned” the task you’re trying to teach it. To test it, you should feed it in new data which you know the answer to and see how well it does on this data. Importantly, this data should not be the same data you used to train the network! A standard process in building an ANN is to collect all your data with the known answers and split that into ~60% for training and ~40% for testing. It is up to you to decide if it meets your standards at this testing phase. If it doesn’t, then you either need to get more training data or else set up your network differently and try again.</a:t>
+            </a:r>
             <a:endParaRPr lang="en-US" dirty="0"/>
           </a:p>
         </p:txBody>
@@ -557,6 +591,643 @@
           <a:p>
             <a:fld id="{40865DB0-5429-4151-A52D-1926E4CCAC76}" type="slidenum">
               <a:rPr lang="en-US" smtClean="0"/>
+              <a:t>2</a:t>
+            </a:fld>
+            <a:endParaRPr lang="en-US"/>
+          </a:p>
+        </p:txBody>
+      </p:sp>
+    </p:spTree>
+    <p:extLst>
+      <p:ext uri="{BB962C8B-B14F-4D97-AF65-F5344CB8AC3E}">
+        <p14:creationId xmlns:p14="http://schemas.microsoft.com/office/powerpoint/2010/main" val="1411448685"/>
+      </p:ext>
+    </p:extLst>
+  </p:cSld>
+  <p:clrMapOvr>
+    <a:masterClrMapping/>
+  </p:clrMapOvr>
+</p:notes>
+</file>
+
+<file path=ppt/notesSlides/notesSlide10.xml><?xml version="1.0" encoding="utf-8"?>
+<p:notes xmlns:a="http://schemas.openxmlformats.org/drawingml/2006/main" xmlns:r="http://schemas.openxmlformats.org/officeDocument/2006/relationships" xmlns:p="http://schemas.openxmlformats.org/presentationml/2006/main">
+  <p:cSld>
+    <p:spTree>
+      <p:nvGrpSpPr>
+        <p:cNvPr id="1" name=""/>
+        <p:cNvGrpSpPr/>
+        <p:nvPr/>
+      </p:nvGrpSpPr>
+      <p:grpSpPr>
+        <a:xfrm>
+          <a:off x="0" y="0"/>
+          <a:ext cx="0" cy="0"/>
+          <a:chOff x="0" y="0"/>
+          <a:chExt cx="0" cy="0"/>
+        </a:xfrm>
+      </p:grpSpPr>
+      <p:sp>
+        <p:nvSpPr>
+          <p:cNvPr id="2" name="Slide Image Placeholder 1"/>
+          <p:cNvSpPr>
+            <a:spLocks noGrp="1" noRot="1" noChangeAspect="1"/>
+          </p:cNvSpPr>
+          <p:nvPr>
+            <p:ph type="sldImg"/>
+          </p:nvPr>
+        </p:nvSpPr>
+        <p:spPr/>
+      </p:sp>
+      <p:sp>
+        <p:nvSpPr>
+          <p:cNvPr id="3" name="Notes Placeholder 2"/>
+          <p:cNvSpPr>
+            <a:spLocks noGrp="1"/>
+          </p:cNvSpPr>
+          <p:nvPr>
+            <p:ph type="body" idx="1"/>
+          </p:nvPr>
+        </p:nvSpPr>
+        <p:spPr/>
+        <p:txBody>
+          <a:bodyPr/>
+          <a:lstStyle/>
+          <a:p>
+            <a:r>
+              <a:rPr lang="en-US" dirty="0" smtClean="0"/>
+              <a:t>Now the ANN will take</a:t>
+            </a:r>
+            <a:r>
+              <a:rPr lang="en-US" baseline="0" dirty="0" smtClean="0"/>
+              <a:t> these hidden node values and propagate them along the statistical weights to the output node and in the end, you should wind up with 1 as the final answer. An MLP is probably good enough to model an AND gate or an OR gate, but cannot be used for more complicated systems – and can’t even model and XOR gate. The reason for this is two-fold. </a:t>
+            </a:r>
+          </a:p>
+          <a:p>
+            <a:endParaRPr lang="en-US" baseline="0" dirty="0" smtClean="0"/>
+          </a:p>
+          <a:p>
+            <a:r>
+              <a:rPr lang="en-US" baseline="0" dirty="0" smtClean="0"/>
+              <a:t>Think back to the fact that the neural network is just a function. Whatever that function is, it exists in some convoluted space. Note that the process so far simply involves multiplying nodes by statistical weights and adding them together. This is essentially just vector and matrix multiplication and represents a linear function. If the process we’re trying to model is non-linear, our function won’t be able to properly model it and the MLP will fail. </a:t>
+            </a:r>
+          </a:p>
+          <a:p>
+            <a:endParaRPr lang="en-US" baseline="0" dirty="0" smtClean="0"/>
+          </a:p>
+          <a:p>
+            <a:r>
+              <a:rPr lang="en-US" baseline="0" dirty="0" smtClean="0"/>
+              <a:t>Another problem comes from the fact that we’ve introduced no way to shift our function around in the space. Consider the function f(x) = x^2. We can scale this and change it by multiplying it by any factor we want, but it must always be constrained to pass through the origin as we’ve never introduced a bias. Suddenly however if we make our function f(x) = x^2 + a, we’ve got much more versatility. This MLP does not exhibit that behavior as it has no bias and thus our function is constrained to pass through the origin.</a:t>
+            </a:r>
+          </a:p>
+          <a:p>
+            <a:endParaRPr lang="en-US" baseline="0" dirty="0" smtClean="0"/>
+          </a:p>
+          <a:p>
+            <a:r>
+              <a:rPr lang="en-US" baseline="0" dirty="0" smtClean="0"/>
+              <a:t>Overall a linear function which must pass through the origin (of whatever space this MLP exists in) is not very useful. Now we move to full ANN to solve these problems.</a:t>
+            </a:r>
+            <a:endParaRPr lang="en-US" dirty="0"/>
+          </a:p>
+        </p:txBody>
+      </p:sp>
+      <p:sp>
+        <p:nvSpPr>
+          <p:cNvPr id="4" name="Slide Number Placeholder 3"/>
+          <p:cNvSpPr>
+            <a:spLocks noGrp="1"/>
+          </p:cNvSpPr>
+          <p:nvPr>
+            <p:ph type="sldNum" sz="quarter" idx="10"/>
+          </p:nvPr>
+        </p:nvSpPr>
+        <p:spPr/>
+        <p:txBody>
+          <a:bodyPr/>
+          <a:lstStyle/>
+          <a:p>
+            <a:fld id="{40865DB0-5429-4151-A52D-1926E4CCAC76}" type="slidenum">
+              <a:rPr lang="en-US" smtClean="0"/>
+              <a:t>11</a:t>
+            </a:fld>
+            <a:endParaRPr lang="en-US"/>
+          </a:p>
+        </p:txBody>
+      </p:sp>
+    </p:spTree>
+    <p:extLst>
+      <p:ext uri="{BB962C8B-B14F-4D97-AF65-F5344CB8AC3E}">
+        <p14:creationId xmlns:p14="http://schemas.microsoft.com/office/powerpoint/2010/main" val="177383587"/>
+      </p:ext>
+    </p:extLst>
+  </p:cSld>
+  <p:clrMapOvr>
+    <a:masterClrMapping/>
+  </p:clrMapOvr>
+</p:notes>
+</file>
+
+<file path=ppt/notesSlides/notesSlide11.xml><?xml version="1.0" encoding="utf-8"?>
+<p:notes xmlns:a="http://schemas.openxmlformats.org/drawingml/2006/main" xmlns:r="http://schemas.openxmlformats.org/officeDocument/2006/relationships" xmlns:p="http://schemas.openxmlformats.org/presentationml/2006/main">
+  <p:cSld>
+    <p:spTree>
+      <p:nvGrpSpPr>
+        <p:cNvPr id="1" name=""/>
+        <p:cNvGrpSpPr/>
+        <p:nvPr/>
+      </p:nvGrpSpPr>
+      <p:grpSpPr>
+        <a:xfrm>
+          <a:off x="0" y="0"/>
+          <a:ext cx="0" cy="0"/>
+          <a:chOff x="0" y="0"/>
+          <a:chExt cx="0" cy="0"/>
+        </a:xfrm>
+      </p:grpSpPr>
+      <p:sp>
+        <p:nvSpPr>
+          <p:cNvPr id="2" name="Slide Image Placeholder 1"/>
+          <p:cNvSpPr>
+            <a:spLocks noGrp="1" noRot="1" noChangeAspect="1"/>
+          </p:cNvSpPr>
+          <p:nvPr>
+            <p:ph type="sldImg"/>
+          </p:nvPr>
+        </p:nvSpPr>
+        <p:spPr/>
+      </p:sp>
+      <p:sp>
+        <p:nvSpPr>
+          <p:cNvPr id="3" name="Notes Placeholder 2"/>
+          <p:cNvSpPr>
+            <a:spLocks noGrp="1"/>
+          </p:cNvSpPr>
+          <p:nvPr>
+            <p:ph type="body" idx="1"/>
+          </p:nvPr>
+        </p:nvSpPr>
+        <p:spPr/>
+        <p:txBody>
+          <a:bodyPr/>
+          <a:lstStyle/>
+          <a:p>
+            <a:r>
+              <a:rPr lang="en-US" dirty="0" smtClean="0"/>
+              <a:t>Here is a full neural network with one important addition</a:t>
+            </a:r>
+            <a:r>
+              <a:rPr lang="en-US" baseline="0" dirty="0" smtClean="0"/>
+              <a:t> – it now has bias nodes. The input layer has been given an extra node which maps to the hidden layer and the hidden layer itself has been given an extra node which maps to the output. If you had more than one hidden layer, each would get its own bias node. The bias node has a few important qualities that you can hopefully see.</a:t>
+            </a:r>
+          </a:p>
+          <a:p>
+            <a:endParaRPr lang="en-US" baseline="0" dirty="0" smtClean="0"/>
+          </a:p>
+          <a:p>
+            <a:r>
+              <a:rPr lang="en-US" baseline="0" dirty="0" smtClean="0"/>
+              <a:t>First, it is always equal to one. The bias node is and should ALWAYS be one and that value is what gets passed along to the next layer through the statistical weights.</a:t>
+            </a:r>
+          </a:p>
+          <a:p>
+            <a:endParaRPr lang="en-US" baseline="0" dirty="0" smtClean="0"/>
+          </a:p>
+          <a:p>
+            <a:r>
+              <a:rPr lang="en-US" baseline="0" dirty="0" smtClean="0"/>
+              <a:t>Second, you’ll notice that no input is coming into the hidden layer’s bias node. Bias nodes receive no input and they shouldn’t as they’re always one. The input layer nodes (including the bias node) will distribute themselves to all the hidden layer nodes except the hidden layer’s bias node.</a:t>
+            </a:r>
+          </a:p>
+          <a:p>
+            <a:endParaRPr lang="en-US" baseline="0" dirty="0" smtClean="0"/>
+          </a:p>
+          <a:p>
+            <a:r>
+              <a:rPr lang="en-US" baseline="0" dirty="0" smtClean="0"/>
+              <a:t>This bias node allows us to effectively add a constant to our function such that it can shift around it its functional space.</a:t>
+            </a:r>
+            <a:endParaRPr lang="en-US" dirty="0"/>
+          </a:p>
+        </p:txBody>
+      </p:sp>
+      <p:sp>
+        <p:nvSpPr>
+          <p:cNvPr id="4" name="Slide Number Placeholder 3"/>
+          <p:cNvSpPr>
+            <a:spLocks noGrp="1"/>
+          </p:cNvSpPr>
+          <p:nvPr>
+            <p:ph type="sldNum" sz="quarter" idx="10"/>
+          </p:nvPr>
+        </p:nvSpPr>
+        <p:spPr/>
+        <p:txBody>
+          <a:bodyPr/>
+          <a:lstStyle/>
+          <a:p>
+            <a:fld id="{40865DB0-5429-4151-A52D-1926E4CCAC76}" type="slidenum">
+              <a:rPr lang="en-US" smtClean="0"/>
+              <a:t>12</a:t>
+            </a:fld>
+            <a:endParaRPr lang="en-US"/>
+          </a:p>
+        </p:txBody>
+      </p:sp>
+    </p:spTree>
+    <p:extLst>
+      <p:ext uri="{BB962C8B-B14F-4D97-AF65-F5344CB8AC3E}">
+        <p14:creationId xmlns:p14="http://schemas.microsoft.com/office/powerpoint/2010/main" val="4258866913"/>
+      </p:ext>
+    </p:extLst>
+  </p:cSld>
+  <p:clrMapOvr>
+    <a:masterClrMapping/>
+  </p:clrMapOvr>
+</p:notes>
+</file>
+
+<file path=ppt/notesSlides/notesSlide12.xml><?xml version="1.0" encoding="utf-8"?>
+<p:notes xmlns:a="http://schemas.openxmlformats.org/drawingml/2006/main" xmlns:r="http://schemas.openxmlformats.org/officeDocument/2006/relationships" xmlns:p="http://schemas.openxmlformats.org/presentationml/2006/main">
+  <p:cSld>
+    <p:spTree>
+      <p:nvGrpSpPr>
+        <p:cNvPr id="1" name=""/>
+        <p:cNvGrpSpPr/>
+        <p:nvPr/>
+      </p:nvGrpSpPr>
+      <p:grpSpPr>
+        <a:xfrm>
+          <a:off x="0" y="0"/>
+          <a:ext cx="0" cy="0"/>
+          <a:chOff x="0" y="0"/>
+          <a:chExt cx="0" cy="0"/>
+        </a:xfrm>
+      </p:grpSpPr>
+      <p:sp>
+        <p:nvSpPr>
+          <p:cNvPr id="2" name="Slide Image Placeholder 1"/>
+          <p:cNvSpPr>
+            <a:spLocks noGrp="1" noRot="1" noChangeAspect="1"/>
+          </p:cNvSpPr>
+          <p:nvPr>
+            <p:ph type="sldImg"/>
+          </p:nvPr>
+        </p:nvSpPr>
+        <p:spPr/>
+      </p:sp>
+      <p:sp>
+        <p:nvSpPr>
+          <p:cNvPr id="3" name="Notes Placeholder 2"/>
+          <p:cNvSpPr>
+            <a:spLocks noGrp="1"/>
+          </p:cNvSpPr>
+          <p:nvPr>
+            <p:ph type="body" idx="1"/>
+          </p:nvPr>
+        </p:nvSpPr>
+        <p:spPr/>
+        <p:txBody>
+          <a:bodyPr/>
+          <a:lstStyle/>
+          <a:p>
+            <a:r>
+              <a:rPr lang="en-US" dirty="0" smtClean="0"/>
+              <a:t>Now let’s go back to our OR</a:t>
+            </a:r>
+            <a:r>
+              <a:rPr lang="en-US" baseline="0" dirty="0" smtClean="0"/>
+              <a:t> gate test case and see how we might run that through this ANN. Again we put the True and False in as 1 and -1. Our input layer is now a 3 element vector containing 1, -1, and 1.</a:t>
+            </a:r>
+            <a:endParaRPr lang="en-US" dirty="0"/>
+          </a:p>
+        </p:txBody>
+      </p:sp>
+      <p:sp>
+        <p:nvSpPr>
+          <p:cNvPr id="4" name="Slide Number Placeholder 3"/>
+          <p:cNvSpPr>
+            <a:spLocks noGrp="1"/>
+          </p:cNvSpPr>
+          <p:nvPr>
+            <p:ph type="sldNum" sz="quarter" idx="10"/>
+          </p:nvPr>
+        </p:nvSpPr>
+        <p:spPr/>
+        <p:txBody>
+          <a:bodyPr/>
+          <a:lstStyle/>
+          <a:p>
+            <a:fld id="{40865DB0-5429-4151-A52D-1926E4CCAC76}" type="slidenum">
+              <a:rPr lang="en-US" smtClean="0"/>
+              <a:t>13</a:t>
+            </a:fld>
+            <a:endParaRPr lang="en-US"/>
+          </a:p>
+        </p:txBody>
+      </p:sp>
+    </p:spTree>
+    <p:extLst>
+      <p:ext uri="{BB962C8B-B14F-4D97-AF65-F5344CB8AC3E}">
+        <p14:creationId xmlns:p14="http://schemas.microsoft.com/office/powerpoint/2010/main" val="1862241798"/>
+      </p:ext>
+    </p:extLst>
+  </p:cSld>
+  <p:clrMapOvr>
+    <a:masterClrMapping/>
+  </p:clrMapOvr>
+</p:notes>
+</file>
+
+<file path=ppt/notesSlides/notesSlide13.xml><?xml version="1.0" encoding="utf-8"?>
+<p:notes xmlns:a="http://schemas.openxmlformats.org/drawingml/2006/main" xmlns:r="http://schemas.openxmlformats.org/officeDocument/2006/relationships" xmlns:p="http://schemas.openxmlformats.org/presentationml/2006/main">
+  <p:cSld>
+    <p:spTree>
+      <p:nvGrpSpPr>
+        <p:cNvPr id="1" name=""/>
+        <p:cNvGrpSpPr/>
+        <p:nvPr/>
+      </p:nvGrpSpPr>
+      <p:grpSpPr>
+        <a:xfrm>
+          <a:off x="0" y="0"/>
+          <a:ext cx="0" cy="0"/>
+          <a:chOff x="0" y="0"/>
+          <a:chExt cx="0" cy="0"/>
+        </a:xfrm>
+      </p:grpSpPr>
+      <p:sp>
+        <p:nvSpPr>
+          <p:cNvPr id="2" name="Slide Image Placeholder 1"/>
+          <p:cNvSpPr>
+            <a:spLocks noGrp="1" noRot="1" noChangeAspect="1"/>
+          </p:cNvSpPr>
+          <p:nvPr>
+            <p:ph type="sldImg"/>
+          </p:nvPr>
+        </p:nvSpPr>
+        <p:spPr/>
+      </p:sp>
+      <p:sp>
+        <p:nvSpPr>
+          <p:cNvPr id="3" name="Notes Placeholder 2"/>
+          <p:cNvSpPr>
+            <a:spLocks noGrp="1"/>
+          </p:cNvSpPr>
+          <p:nvPr>
+            <p:ph type="body" idx="1"/>
+          </p:nvPr>
+        </p:nvSpPr>
+        <p:spPr/>
+        <p:txBody>
+          <a:bodyPr/>
+          <a:lstStyle/>
+          <a:p>
+            <a:r>
+              <a:rPr lang="en-US" dirty="0" smtClean="0"/>
+              <a:t>Now the input layer</a:t>
+            </a:r>
+            <a:r>
+              <a:rPr lang="en-US" baseline="0" dirty="0" smtClean="0"/>
+              <a:t> propagates to the hidden layer. Importantly, our bias node comes along for the ride.</a:t>
+            </a:r>
+            <a:endParaRPr lang="en-US" dirty="0"/>
+          </a:p>
+        </p:txBody>
+      </p:sp>
+      <p:sp>
+        <p:nvSpPr>
+          <p:cNvPr id="4" name="Slide Number Placeholder 3"/>
+          <p:cNvSpPr>
+            <a:spLocks noGrp="1"/>
+          </p:cNvSpPr>
+          <p:nvPr>
+            <p:ph type="sldNum" sz="quarter" idx="10"/>
+          </p:nvPr>
+        </p:nvSpPr>
+        <p:spPr/>
+        <p:txBody>
+          <a:bodyPr/>
+          <a:lstStyle/>
+          <a:p>
+            <a:fld id="{40865DB0-5429-4151-A52D-1926E4CCAC76}" type="slidenum">
+              <a:rPr lang="en-US" smtClean="0"/>
+              <a:t>14</a:t>
+            </a:fld>
+            <a:endParaRPr lang="en-US"/>
+          </a:p>
+        </p:txBody>
+      </p:sp>
+    </p:spTree>
+    <p:extLst>
+      <p:ext uri="{BB962C8B-B14F-4D97-AF65-F5344CB8AC3E}">
+        <p14:creationId xmlns:p14="http://schemas.microsoft.com/office/powerpoint/2010/main" val="730978976"/>
+      </p:ext>
+    </p:extLst>
+  </p:cSld>
+  <p:clrMapOvr>
+    <a:masterClrMapping/>
+  </p:clrMapOvr>
+</p:notes>
+</file>
+
+<file path=ppt/notesSlides/notesSlide14.xml><?xml version="1.0" encoding="utf-8"?>
+<p:notes xmlns:a="http://schemas.openxmlformats.org/drawingml/2006/main" xmlns:r="http://schemas.openxmlformats.org/officeDocument/2006/relationships" xmlns:p="http://schemas.openxmlformats.org/presentationml/2006/main">
+  <p:cSld>
+    <p:spTree>
+      <p:nvGrpSpPr>
+        <p:cNvPr id="1" name=""/>
+        <p:cNvGrpSpPr/>
+        <p:nvPr/>
+      </p:nvGrpSpPr>
+      <p:grpSpPr>
+        <a:xfrm>
+          <a:off x="0" y="0"/>
+          <a:ext cx="0" cy="0"/>
+          <a:chOff x="0" y="0"/>
+          <a:chExt cx="0" cy="0"/>
+        </a:xfrm>
+      </p:grpSpPr>
+      <p:sp>
+        <p:nvSpPr>
+          <p:cNvPr id="2" name="Slide Image Placeholder 1"/>
+          <p:cNvSpPr>
+            <a:spLocks noGrp="1" noRot="1" noChangeAspect="1"/>
+          </p:cNvSpPr>
+          <p:nvPr>
+            <p:ph type="sldImg"/>
+          </p:nvPr>
+        </p:nvSpPr>
+        <p:spPr/>
+      </p:sp>
+      <p:sp>
+        <p:nvSpPr>
+          <p:cNvPr id="3" name="Notes Placeholder 2"/>
+          <p:cNvSpPr>
+            <a:spLocks noGrp="1"/>
+          </p:cNvSpPr>
+          <p:nvPr>
+            <p:ph type="body" idx="1"/>
+          </p:nvPr>
+        </p:nvSpPr>
+        <p:spPr/>
+        <p:txBody>
+          <a:bodyPr/>
+          <a:lstStyle/>
+          <a:p>
+            <a:r>
+              <a:rPr lang="en-US" dirty="0" smtClean="0"/>
+              <a:t>At this stage we do something very important.</a:t>
+            </a:r>
+            <a:r>
+              <a:rPr lang="en-US" baseline="0" dirty="0" smtClean="0"/>
+              <a:t> Remember that we described the MLP as having two failings. The first was the lack of a bias term which we’ve fixed with the bias nodes. The other problem was that our function was linear. Now we fix this issue by applying a non-linear sigmoidal function to all the nodes (except the bias) in the hidden layer before we allow them to propagate to the output layer. Shown above is an example of a commonly used sigmoidal function. The twirling values represent them being changed to new values by putting them through the sigmoidal function. Once that is done, we can then send the hidden layer to the output. It is standard to reapply the sigmoidal function to the output as well once you’re done and only then do you consider that the answer the ANN provides.</a:t>
+            </a:r>
+          </a:p>
+          <a:p>
+            <a:endParaRPr lang="en-US" baseline="0" dirty="0" smtClean="0"/>
+          </a:p>
+          <a:p>
+            <a:r>
+              <a:rPr lang="en-US" baseline="0" dirty="0" smtClean="0"/>
+              <a:t>Described here is a basic ANN. They can of course become much more complex. One could have many more input nodes, many more hidden layer nodes, and in fact many more hidden layers. There is a concept known as deep learning using deep neural networks which is the cutting edge in AI and is a neural network with many of hidden layers. There are also other complicated structures which have statistical weights set up in more convoluted patterns.</a:t>
+            </a:r>
+            <a:endParaRPr lang="en-US" dirty="0"/>
+          </a:p>
+        </p:txBody>
+      </p:sp>
+      <p:sp>
+        <p:nvSpPr>
+          <p:cNvPr id="4" name="Slide Number Placeholder 3"/>
+          <p:cNvSpPr>
+            <a:spLocks noGrp="1"/>
+          </p:cNvSpPr>
+          <p:nvPr>
+            <p:ph type="sldNum" sz="quarter" idx="10"/>
+          </p:nvPr>
+        </p:nvSpPr>
+        <p:spPr/>
+        <p:txBody>
+          <a:bodyPr/>
+          <a:lstStyle/>
+          <a:p>
+            <a:fld id="{40865DB0-5429-4151-A52D-1926E4CCAC76}" type="slidenum">
+              <a:rPr lang="en-US" smtClean="0"/>
+              <a:t>15</a:t>
+            </a:fld>
+            <a:endParaRPr lang="en-US"/>
+          </a:p>
+        </p:txBody>
+      </p:sp>
+    </p:spTree>
+    <p:extLst>
+      <p:ext uri="{BB962C8B-B14F-4D97-AF65-F5344CB8AC3E}">
+        <p14:creationId xmlns:p14="http://schemas.microsoft.com/office/powerpoint/2010/main" val="3564314340"/>
+      </p:ext>
+    </p:extLst>
+  </p:cSld>
+  <p:clrMapOvr>
+    <a:masterClrMapping/>
+  </p:clrMapOvr>
+</p:notes>
+</file>
+
+<file path=ppt/notesSlides/notesSlide15.xml><?xml version="1.0" encoding="utf-8"?>
+<p:notes xmlns:a="http://schemas.openxmlformats.org/drawingml/2006/main" xmlns:r="http://schemas.openxmlformats.org/officeDocument/2006/relationships" xmlns:p="http://schemas.openxmlformats.org/presentationml/2006/main">
+  <p:cSld>
+    <p:spTree>
+      <p:nvGrpSpPr>
+        <p:cNvPr id="1" name=""/>
+        <p:cNvGrpSpPr/>
+        <p:nvPr/>
+      </p:nvGrpSpPr>
+      <p:grpSpPr>
+        <a:xfrm>
+          <a:off x="0" y="0"/>
+          <a:ext cx="0" cy="0"/>
+          <a:chOff x="0" y="0"/>
+          <a:chExt cx="0" cy="0"/>
+        </a:xfrm>
+      </p:grpSpPr>
+      <p:sp>
+        <p:nvSpPr>
+          <p:cNvPr id="2" name="Slide Image Placeholder 1"/>
+          <p:cNvSpPr>
+            <a:spLocks noGrp="1" noRot="1" noChangeAspect="1"/>
+          </p:cNvSpPr>
+          <p:nvPr>
+            <p:ph type="sldImg"/>
+          </p:nvPr>
+        </p:nvSpPr>
+        <p:spPr/>
+      </p:sp>
+      <p:sp>
+        <p:nvSpPr>
+          <p:cNvPr id="3" name="Notes Placeholder 2"/>
+          <p:cNvSpPr>
+            <a:spLocks noGrp="1"/>
+          </p:cNvSpPr>
+          <p:nvPr>
+            <p:ph type="body" idx="1"/>
+          </p:nvPr>
+        </p:nvSpPr>
+        <p:spPr/>
+        <p:txBody>
+          <a:bodyPr/>
+          <a:lstStyle/>
+          <a:p>
+            <a:r>
+              <a:rPr lang="en-US" dirty="0" smtClean="0"/>
+              <a:t>Lastly</a:t>
+            </a:r>
+            <a:r>
+              <a:rPr lang="en-US" baseline="0" dirty="0" smtClean="0"/>
+              <a:t>, it is important to cover how the output is processed into a sensible result. There are two main types of neural networks and they are used in different instances.</a:t>
+            </a:r>
+          </a:p>
+          <a:p>
+            <a:endParaRPr lang="en-US" baseline="0" dirty="0" smtClean="0"/>
+          </a:p>
+          <a:p>
+            <a:r>
+              <a:rPr lang="en-US" baseline="0" dirty="0" smtClean="0"/>
+              <a:t>The first is a general regression neural network (GRNN) and it has a single output node. This output node is able to represent a continuum of potential states based on the input data. An example where a GRNN is useful would be in determining the amount of expected rain tomorrow. One could set up a network that accepts weather data (in whatever form that might be) and is able to result in a single number as its output which represents the total amount of expected rain. As you can see, the amount of rain is a continuum as we can have any amount of rain rather than discrete amounts.</a:t>
+            </a:r>
+          </a:p>
+          <a:p>
+            <a:endParaRPr lang="en-US" baseline="0" dirty="0" smtClean="0"/>
+          </a:p>
+          <a:p>
+            <a:r>
+              <a:rPr lang="en-US" baseline="0" dirty="0" smtClean="0"/>
+              <a:t>The other type of network is a probabilistic neural network (PNN) which can have many output nodes. This type of network is better for representing discrete answers. Suppose for example you wanted to determine if it would be sunny or rainy tomorrow. You could set up a network which again accepts weather data. It would then output to two nodes, one of which represents the probability that it is sunny, the other the probability that it is rainy. A potential output might be (0.8, 0.2) which would indicate that it is 80% likely to be sunny and 20% likely to be rainy. This type of network will probabilistically indicate the most likely answer from a discrete set </a:t>
+            </a:r>
+            <a:r>
+              <a:rPr lang="en-US" baseline="0" smtClean="0"/>
+              <a:t>of outcomes.</a:t>
+            </a:r>
+            <a:endParaRPr lang="en-US" dirty="0"/>
+          </a:p>
+        </p:txBody>
+      </p:sp>
+      <p:sp>
+        <p:nvSpPr>
+          <p:cNvPr id="4" name="Slide Number Placeholder 3"/>
+          <p:cNvSpPr>
+            <a:spLocks noGrp="1"/>
+          </p:cNvSpPr>
+          <p:nvPr>
+            <p:ph type="sldNum" sz="quarter" idx="10"/>
+          </p:nvPr>
+        </p:nvSpPr>
+        <p:spPr/>
+        <p:txBody>
+          <a:bodyPr/>
+          <a:lstStyle/>
+          <a:p>
+            <a:fld id="{40865DB0-5429-4151-A52D-1926E4CCAC76}" type="slidenum">
+              <a:rPr lang="en-US" smtClean="0"/>
               <a:t>16</a:t>
             </a:fld>
             <a:endParaRPr lang="en-US"/>
@@ -567,6 +1238,770 @@
     <p:extLst>
       <p:ext uri="{BB962C8B-B14F-4D97-AF65-F5344CB8AC3E}">
         <p14:creationId xmlns:p14="http://schemas.microsoft.com/office/powerpoint/2010/main" val="3650939790"/>
+      </p:ext>
+    </p:extLst>
+  </p:cSld>
+  <p:clrMapOvr>
+    <a:masterClrMapping/>
+  </p:clrMapOvr>
+</p:notes>
+</file>
+
+<file path=ppt/notesSlides/notesSlide2.xml><?xml version="1.0" encoding="utf-8"?>
+<p:notes xmlns:a="http://schemas.openxmlformats.org/drawingml/2006/main" xmlns:r="http://schemas.openxmlformats.org/officeDocument/2006/relationships" xmlns:p="http://schemas.openxmlformats.org/presentationml/2006/main">
+  <p:cSld>
+    <p:spTree>
+      <p:nvGrpSpPr>
+        <p:cNvPr id="1" name=""/>
+        <p:cNvGrpSpPr/>
+        <p:nvPr/>
+      </p:nvGrpSpPr>
+      <p:grpSpPr>
+        <a:xfrm>
+          <a:off x="0" y="0"/>
+          <a:ext cx="0" cy="0"/>
+          <a:chOff x="0" y="0"/>
+          <a:chExt cx="0" cy="0"/>
+        </a:xfrm>
+      </p:grpSpPr>
+      <p:sp>
+        <p:nvSpPr>
+          <p:cNvPr id="2" name="Slide Image Placeholder 1"/>
+          <p:cNvSpPr>
+            <a:spLocks noGrp="1" noRot="1" noChangeAspect="1"/>
+          </p:cNvSpPr>
+          <p:nvPr>
+            <p:ph type="sldImg"/>
+          </p:nvPr>
+        </p:nvSpPr>
+        <p:spPr/>
+      </p:sp>
+      <p:sp>
+        <p:nvSpPr>
+          <p:cNvPr id="3" name="Notes Placeholder 2"/>
+          <p:cNvSpPr>
+            <a:spLocks noGrp="1"/>
+          </p:cNvSpPr>
+          <p:nvPr>
+            <p:ph type="body" idx="1"/>
+          </p:nvPr>
+        </p:nvSpPr>
+        <p:spPr/>
+        <p:txBody>
+          <a:bodyPr/>
+          <a:lstStyle/>
+          <a:p>
+            <a:r>
+              <a:rPr lang="en-US" baseline="0" dirty="0" smtClean="0"/>
+              <a:t>In the most general sense, a function is simply something that takes an input, changes it in some predetermined way, and produces an output. And that’s all a neural network is – a function which takes some input and converts it to an output. The advantage of a neural network is that this function can be vastly complex (which is necessary to model complex behavior and “thinking”) and you don’t even have to know what the function is. You just let the ANN figure out the proper function.</a:t>
+            </a:r>
+          </a:p>
+        </p:txBody>
+      </p:sp>
+      <p:sp>
+        <p:nvSpPr>
+          <p:cNvPr id="4" name="Slide Number Placeholder 3"/>
+          <p:cNvSpPr>
+            <a:spLocks noGrp="1"/>
+          </p:cNvSpPr>
+          <p:nvPr>
+            <p:ph type="sldNum" sz="quarter" idx="10"/>
+          </p:nvPr>
+        </p:nvSpPr>
+        <p:spPr/>
+        <p:txBody>
+          <a:bodyPr/>
+          <a:lstStyle/>
+          <a:p>
+            <a:fld id="{40865DB0-5429-4151-A52D-1926E4CCAC76}" type="slidenum">
+              <a:rPr lang="en-US" smtClean="0"/>
+              <a:t>3</a:t>
+            </a:fld>
+            <a:endParaRPr lang="en-US"/>
+          </a:p>
+        </p:txBody>
+      </p:sp>
+    </p:spTree>
+    <p:extLst>
+      <p:ext uri="{BB962C8B-B14F-4D97-AF65-F5344CB8AC3E}">
+        <p14:creationId xmlns:p14="http://schemas.microsoft.com/office/powerpoint/2010/main" val="3675623501"/>
+      </p:ext>
+    </p:extLst>
+  </p:cSld>
+  <p:clrMapOvr>
+    <a:masterClrMapping/>
+  </p:clrMapOvr>
+</p:notes>
+</file>
+
+<file path=ppt/notesSlides/notesSlide3.xml><?xml version="1.0" encoding="utf-8"?>
+<p:notes xmlns:a="http://schemas.openxmlformats.org/drawingml/2006/main" xmlns:r="http://schemas.openxmlformats.org/officeDocument/2006/relationships" xmlns:p="http://schemas.openxmlformats.org/presentationml/2006/main">
+  <p:cSld>
+    <p:spTree>
+      <p:nvGrpSpPr>
+        <p:cNvPr id="1" name=""/>
+        <p:cNvGrpSpPr/>
+        <p:nvPr/>
+      </p:nvGrpSpPr>
+      <p:grpSpPr>
+        <a:xfrm>
+          <a:off x="0" y="0"/>
+          <a:ext cx="0" cy="0"/>
+          <a:chOff x="0" y="0"/>
+          <a:chExt cx="0" cy="0"/>
+        </a:xfrm>
+      </p:grpSpPr>
+      <p:sp>
+        <p:nvSpPr>
+          <p:cNvPr id="2" name="Slide Image Placeholder 1"/>
+          <p:cNvSpPr>
+            <a:spLocks noGrp="1" noRot="1" noChangeAspect="1"/>
+          </p:cNvSpPr>
+          <p:nvPr>
+            <p:ph type="sldImg"/>
+          </p:nvPr>
+        </p:nvSpPr>
+        <p:spPr/>
+      </p:sp>
+      <p:sp>
+        <p:nvSpPr>
+          <p:cNvPr id="3" name="Notes Placeholder 2"/>
+          <p:cNvSpPr>
+            <a:spLocks noGrp="1"/>
+          </p:cNvSpPr>
+          <p:nvPr>
+            <p:ph type="body" idx="1"/>
+          </p:nvPr>
+        </p:nvSpPr>
+        <p:spPr/>
+        <p:txBody>
+          <a:bodyPr/>
+          <a:lstStyle/>
+          <a:p>
+            <a:r>
+              <a:rPr lang="en-US" dirty="0" smtClean="0"/>
+              <a:t>Before delving into neural networks, we cover logic gates briefly.</a:t>
+            </a:r>
+            <a:r>
+              <a:rPr lang="en-US" baseline="0" dirty="0" smtClean="0"/>
+              <a:t> Logic gates an a great and simple concept that can be modeled with an ANN. A logic gate, in the simplest sense, is something which accepts as input two True/False values and produces a single True/False value based on the inputs. Above are three common logic gates that you have probably used many times in programming. Throughout this </a:t>
+            </a:r>
+            <a:r>
+              <a:rPr lang="en-US" baseline="0" dirty="0" err="1" smtClean="0"/>
+              <a:t>powerpoint</a:t>
+            </a:r>
+            <a:r>
+              <a:rPr lang="en-US" baseline="0" dirty="0" smtClean="0"/>
+              <a:t>, we will use the OR logic gate as an example when describing ANN. Note however that rather than feeding in true and false (or even 1 and 0) we will be using 1 and -1 respectively. As stated before, it is important to properly set up your network and using 1 and -1 works better for ANN.</a:t>
+            </a:r>
+            <a:endParaRPr lang="en-US" dirty="0"/>
+          </a:p>
+        </p:txBody>
+      </p:sp>
+      <p:sp>
+        <p:nvSpPr>
+          <p:cNvPr id="4" name="Slide Number Placeholder 3"/>
+          <p:cNvSpPr>
+            <a:spLocks noGrp="1"/>
+          </p:cNvSpPr>
+          <p:nvPr>
+            <p:ph type="sldNum" sz="quarter" idx="10"/>
+          </p:nvPr>
+        </p:nvSpPr>
+        <p:spPr/>
+        <p:txBody>
+          <a:bodyPr/>
+          <a:lstStyle/>
+          <a:p>
+            <a:fld id="{40865DB0-5429-4151-A52D-1926E4CCAC76}" type="slidenum">
+              <a:rPr lang="en-US" smtClean="0"/>
+              <a:t>4</a:t>
+            </a:fld>
+            <a:endParaRPr lang="en-US"/>
+          </a:p>
+        </p:txBody>
+      </p:sp>
+    </p:spTree>
+    <p:extLst>
+      <p:ext uri="{BB962C8B-B14F-4D97-AF65-F5344CB8AC3E}">
+        <p14:creationId xmlns:p14="http://schemas.microsoft.com/office/powerpoint/2010/main" val="961179261"/>
+      </p:ext>
+    </p:extLst>
+  </p:cSld>
+  <p:clrMapOvr>
+    <a:masterClrMapping/>
+  </p:clrMapOvr>
+</p:notes>
+</file>
+
+<file path=ppt/notesSlides/notesSlide4.xml><?xml version="1.0" encoding="utf-8"?>
+<p:notes xmlns:a="http://schemas.openxmlformats.org/drawingml/2006/main" xmlns:r="http://schemas.openxmlformats.org/officeDocument/2006/relationships" xmlns:p="http://schemas.openxmlformats.org/presentationml/2006/main">
+  <p:cSld>
+    <p:spTree>
+      <p:nvGrpSpPr>
+        <p:cNvPr id="1" name=""/>
+        <p:cNvGrpSpPr/>
+        <p:nvPr/>
+      </p:nvGrpSpPr>
+      <p:grpSpPr>
+        <a:xfrm>
+          <a:off x="0" y="0"/>
+          <a:ext cx="0" cy="0"/>
+          <a:chOff x="0" y="0"/>
+          <a:chExt cx="0" cy="0"/>
+        </a:xfrm>
+      </p:grpSpPr>
+      <p:sp>
+        <p:nvSpPr>
+          <p:cNvPr id="2" name="Slide Image Placeholder 1"/>
+          <p:cNvSpPr>
+            <a:spLocks noGrp="1" noRot="1" noChangeAspect="1"/>
+          </p:cNvSpPr>
+          <p:nvPr>
+            <p:ph type="sldImg"/>
+          </p:nvPr>
+        </p:nvSpPr>
+        <p:spPr/>
+      </p:sp>
+      <p:sp>
+        <p:nvSpPr>
+          <p:cNvPr id="3" name="Notes Placeholder 2"/>
+          <p:cNvSpPr>
+            <a:spLocks noGrp="1"/>
+          </p:cNvSpPr>
+          <p:nvPr>
+            <p:ph type="body" idx="1"/>
+          </p:nvPr>
+        </p:nvSpPr>
+        <p:spPr/>
+        <p:txBody>
+          <a:bodyPr/>
+          <a:lstStyle/>
+          <a:p>
+            <a:r>
+              <a:rPr lang="en-US" dirty="0" smtClean="0"/>
+              <a:t>Before moving on to true</a:t>
+            </a:r>
+            <a:r>
+              <a:rPr lang="en-US" baseline="0" dirty="0" smtClean="0"/>
+              <a:t> ANN, we have to talk about their precursors – </a:t>
+            </a:r>
+            <a:r>
+              <a:rPr lang="en-US" baseline="0" dirty="0" err="1" smtClean="0"/>
+              <a:t>Perceptrons</a:t>
+            </a:r>
+            <a:r>
+              <a:rPr lang="en-US" baseline="0" dirty="0" smtClean="0"/>
+              <a:t>. Above is a schematic for a very simple perceptron which has three labeled components. First is the input layer which has two “nodes”. Each node accepts a single input and you can think of the above input layer as a 2 element vector if you wish. Very often the inputs are simply numbers, but they need not be. They could in theory be more complicated structures such as integrals, images, or anything really. The next component are the statistical weights, represented by the arrows connecting the nodes. As the input progresses through the neural network, it is transformed by the statistical weights. In this schematic, each input node is connected to the output and the network will take each input value from each node, scale it by the proper statistical weight, and combine them into a single output value. In the simplest case, you could consider these statistical weights as a 2x1 matrix. Lastly is the output layer. This is where the final answer will pop out of the network and you can see that it has a single node.</a:t>
+            </a:r>
+            <a:endParaRPr lang="en-US" dirty="0"/>
+          </a:p>
+        </p:txBody>
+      </p:sp>
+      <p:sp>
+        <p:nvSpPr>
+          <p:cNvPr id="4" name="Slide Number Placeholder 3"/>
+          <p:cNvSpPr>
+            <a:spLocks noGrp="1"/>
+          </p:cNvSpPr>
+          <p:nvPr>
+            <p:ph type="sldNum" sz="quarter" idx="10"/>
+          </p:nvPr>
+        </p:nvSpPr>
+        <p:spPr/>
+        <p:txBody>
+          <a:bodyPr/>
+          <a:lstStyle/>
+          <a:p>
+            <a:fld id="{40865DB0-5429-4151-A52D-1926E4CCAC76}" type="slidenum">
+              <a:rPr lang="en-US" smtClean="0"/>
+              <a:t>5</a:t>
+            </a:fld>
+            <a:endParaRPr lang="en-US"/>
+          </a:p>
+        </p:txBody>
+      </p:sp>
+    </p:spTree>
+    <p:extLst>
+      <p:ext uri="{BB962C8B-B14F-4D97-AF65-F5344CB8AC3E}">
+        <p14:creationId xmlns:p14="http://schemas.microsoft.com/office/powerpoint/2010/main" val="1838963362"/>
+      </p:ext>
+    </p:extLst>
+  </p:cSld>
+  <p:clrMapOvr>
+    <a:masterClrMapping/>
+  </p:clrMapOvr>
+</p:notes>
+</file>
+
+<file path=ppt/notesSlides/notesSlide5.xml><?xml version="1.0" encoding="utf-8"?>
+<p:notes xmlns:a="http://schemas.openxmlformats.org/drawingml/2006/main" xmlns:r="http://schemas.openxmlformats.org/officeDocument/2006/relationships" xmlns:p="http://schemas.openxmlformats.org/presentationml/2006/main">
+  <p:cSld>
+    <p:spTree>
+      <p:nvGrpSpPr>
+        <p:cNvPr id="1" name=""/>
+        <p:cNvGrpSpPr/>
+        <p:nvPr/>
+      </p:nvGrpSpPr>
+      <p:grpSpPr>
+        <a:xfrm>
+          <a:off x="0" y="0"/>
+          <a:ext cx="0" cy="0"/>
+          <a:chOff x="0" y="0"/>
+          <a:chExt cx="0" cy="0"/>
+        </a:xfrm>
+      </p:grpSpPr>
+      <p:sp>
+        <p:nvSpPr>
+          <p:cNvPr id="2" name="Slide Image Placeholder 1"/>
+          <p:cNvSpPr>
+            <a:spLocks noGrp="1" noRot="1" noChangeAspect="1"/>
+          </p:cNvSpPr>
+          <p:nvPr>
+            <p:ph type="sldImg"/>
+          </p:nvPr>
+        </p:nvSpPr>
+        <p:spPr/>
+      </p:sp>
+      <p:sp>
+        <p:nvSpPr>
+          <p:cNvPr id="3" name="Notes Placeholder 2"/>
+          <p:cNvSpPr>
+            <a:spLocks noGrp="1"/>
+          </p:cNvSpPr>
+          <p:nvPr>
+            <p:ph type="body" idx="1"/>
+          </p:nvPr>
+        </p:nvSpPr>
+        <p:spPr/>
+        <p:txBody>
+          <a:bodyPr/>
+          <a:lstStyle/>
+          <a:p>
+            <a:r>
+              <a:rPr lang="en-US" dirty="0" smtClean="0"/>
+              <a:t>Let’s now look at how a perceptron might model an OR gate. As input we choose the first value to be True and the second value to be False. Remember, these are converted to 1 and -1 when</a:t>
+            </a:r>
+            <a:r>
+              <a:rPr lang="en-US" baseline="0" dirty="0" smtClean="0"/>
+              <a:t> we actually feed it into the network.</a:t>
+            </a:r>
+            <a:endParaRPr lang="en-US" dirty="0"/>
+          </a:p>
+        </p:txBody>
+      </p:sp>
+      <p:sp>
+        <p:nvSpPr>
+          <p:cNvPr id="4" name="Slide Number Placeholder 3"/>
+          <p:cNvSpPr>
+            <a:spLocks noGrp="1"/>
+          </p:cNvSpPr>
+          <p:nvPr>
+            <p:ph type="sldNum" sz="quarter" idx="10"/>
+          </p:nvPr>
+        </p:nvSpPr>
+        <p:spPr/>
+        <p:txBody>
+          <a:bodyPr/>
+          <a:lstStyle/>
+          <a:p>
+            <a:fld id="{40865DB0-5429-4151-A52D-1926E4CCAC76}" type="slidenum">
+              <a:rPr lang="en-US" smtClean="0"/>
+              <a:t>6</a:t>
+            </a:fld>
+            <a:endParaRPr lang="en-US"/>
+          </a:p>
+        </p:txBody>
+      </p:sp>
+    </p:spTree>
+    <p:extLst>
+      <p:ext uri="{BB962C8B-B14F-4D97-AF65-F5344CB8AC3E}">
+        <p14:creationId xmlns:p14="http://schemas.microsoft.com/office/powerpoint/2010/main" val="3049660539"/>
+      </p:ext>
+    </p:extLst>
+  </p:cSld>
+  <p:clrMapOvr>
+    <a:masterClrMapping/>
+  </p:clrMapOvr>
+</p:notes>
+</file>
+
+<file path=ppt/notesSlides/notesSlide6.xml><?xml version="1.0" encoding="utf-8"?>
+<p:notes xmlns:a="http://schemas.openxmlformats.org/drawingml/2006/main" xmlns:r="http://schemas.openxmlformats.org/officeDocument/2006/relationships" xmlns:p="http://schemas.openxmlformats.org/presentationml/2006/main">
+  <p:cSld>
+    <p:spTree>
+      <p:nvGrpSpPr>
+        <p:cNvPr id="1" name=""/>
+        <p:cNvGrpSpPr/>
+        <p:nvPr/>
+      </p:nvGrpSpPr>
+      <p:grpSpPr>
+        <a:xfrm>
+          <a:off x="0" y="0"/>
+          <a:ext cx="0" cy="0"/>
+          <a:chOff x="0" y="0"/>
+          <a:chExt cx="0" cy="0"/>
+        </a:xfrm>
+      </p:grpSpPr>
+      <p:sp>
+        <p:nvSpPr>
+          <p:cNvPr id="2" name="Slide Image Placeholder 1"/>
+          <p:cNvSpPr>
+            <a:spLocks noGrp="1" noRot="1" noChangeAspect="1"/>
+          </p:cNvSpPr>
+          <p:nvPr>
+            <p:ph type="sldImg"/>
+          </p:nvPr>
+        </p:nvSpPr>
+        <p:spPr/>
+      </p:sp>
+      <p:sp>
+        <p:nvSpPr>
+          <p:cNvPr id="3" name="Notes Placeholder 2"/>
+          <p:cNvSpPr>
+            <a:spLocks noGrp="1"/>
+          </p:cNvSpPr>
+          <p:nvPr>
+            <p:ph type="body" idx="1"/>
+          </p:nvPr>
+        </p:nvSpPr>
+        <p:spPr/>
+        <p:txBody>
+          <a:bodyPr/>
+          <a:lstStyle/>
+          <a:p>
+            <a:r>
+              <a:rPr lang="en-US" dirty="0" smtClean="0"/>
+              <a:t>Now that we put in our input values, we can run it through</a:t>
+            </a:r>
+            <a:r>
+              <a:rPr lang="en-US" baseline="0" dirty="0" smtClean="0"/>
+              <a:t> the network. In this case of course, the network is almost trivial and we simply have to multiply our 2 input values by 2 statistical weights and add them to get a final answer, which should be 1 for the OR gate.</a:t>
+            </a:r>
+          </a:p>
+          <a:p>
+            <a:endParaRPr lang="en-US" baseline="0" dirty="0" smtClean="0"/>
+          </a:p>
+          <a:p>
+            <a:r>
+              <a:rPr lang="en-US" baseline="0" dirty="0" smtClean="0"/>
+              <a:t>Unfortunately, such a simple network is not sufficient to properly model an OR gate as is shown above. We require more complexity. So let’s make this network more complex!</a:t>
+            </a:r>
+            <a:endParaRPr lang="en-US" dirty="0"/>
+          </a:p>
+        </p:txBody>
+      </p:sp>
+      <p:sp>
+        <p:nvSpPr>
+          <p:cNvPr id="4" name="Slide Number Placeholder 3"/>
+          <p:cNvSpPr>
+            <a:spLocks noGrp="1"/>
+          </p:cNvSpPr>
+          <p:nvPr>
+            <p:ph type="sldNum" sz="quarter" idx="10"/>
+          </p:nvPr>
+        </p:nvSpPr>
+        <p:spPr/>
+        <p:txBody>
+          <a:bodyPr/>
+          <a:lstStyle/>
+          <a:p>
+            <a:fld id="{40865DB0-5429-4151-A52D-1926E4CCAC76}" type="slidenum">
+              <a:rPr lang="en-US" smtClean="0"/>
+              <a:t>7</a:t>
+            </a:fld>
+            <a:endParaRPr lang="en-US"/>
+          </a:p>
+        </p:txBody>
+      </p:sp>
+    </p:spTree>
+    <p:extLst>
+      <p:ext uri="{BB962C8B-B14F-4D97-AF65-F5344CB8AC3E}">
+        <p14:creationId xmlns:p14="http://schemas.microsoft.com/office/powerpoint/2010/main" val="2078067659"/>
+      </p:ext>
+    </p:extLst>
+  </p:cSld>
+  <p:clrMapOvr>
+    <a:masterClrMapping/>
+  </p:clrMapOvr>
+</p:notes>
+</file>
+
+<file path=ppt/notesSlides/notesSlide7.xml><?xml version="1.0" encoding="utf-8"?>
+<p:notes xmlns:a="http://schemas.openxmlformats.org/drawingml/2006/main" xmlns:r="http://schemas.openxmlformats.org/officeDocument/2006/relationships" xmlns:p="http://schemas.openxmlformats.org/presentationml/2006/main">
+  <p:cSld>
+    <p:spTree>
+      <p:nvGrpSpPr>
+        <p:cNvPr id="1" name=""/>
+        <p:cNvGrpSpPr/>
+        <p:nvPr/>
+      </p:nvGrpSpPr>
+      <p:grpSpPr>
+        <a:xfrm>
+          <a:off x="0" y="0"/>
+          <a:ext cx="0" cy="0"/>
+          <a:chOff x="0" y="0"/>
+          <a:chExt cx="0" cy="0"/>
+        </a:xfrm>
+      </p:grpSpPr>
+      <p:sp>
+        <p:nvSpPr>
+          <p:cNvPr id="2" name="Slide Image Placeholder 1"/>
+          <p:cNvSpPr>
+            <a:spLocks noGrp="1" noRot="1" noChangeAspect="1"/>
+          </p:cNvSpPr>
+          <p:nvPr>
+            <p:ph type="sldImg"/>
+          </p:nvPr>
+        </p:nvSpPr>
+        <p:spPr/>
+      </p:sp>
+      <p:sp>
+        <p:nvSpPr>
+          <p:cNvPr id="3" name="Notes Placeholder 2"/>
+          <p:cNvSpPr>
+            <a:spLocks noGrp="1"/>
+          </p:cNvSpPr>
+          <p:nvPr>
+            <p:ph type="body" idx="1"/>
+          </p:nvPr>
+        </p:nvSpPr>
+        <p:spPr/>
+        <p:txBody>
+          <a:bodyPr/>
+          <a:lstStyle/>
+          <a:p>
+            <a:r>
+              <a:rPr lang="en-US" dirty="0" smtClean="0"/>
+              <a:t>Here we move on to multi-layered </a:t>
+            </a:r>
+            <a:r>
+              <a:rPr lang="en-US" dirty="0" err="1" smtClean="0"/>
+              <a:t>perceptrons</a:t>
+            </a:r>
+            <a:r>
+              <a:rPr lang="en-US" dirty="0" smtClean="0"/>
+              <a:t> or MLPs.</a:t>
+            </a:r>
+            <a:r>
+              <a:rPr lang="en-US" baseline="0" dirty="0" smtClean="0"/>
+              <a:t> This appears similar to the previous example, except now we have an intermediary middle layer between the input and the output. Notice here that every single input node is connected to every single hidden layer node. The hidden layer adds complexity to our system and allows for modeling more complex systems. It is called a hidden layer because you never truly know the values in this layer. That is all handled internally by the network and is thus hidden from the user (although you could of course figure it out if you so desired – but it would be incomprehensible even if you did).</a:t>
+            </a:r>
+            <a:endParaRPr lang="en-US" dirty="0"/>
+          </a:p>
+        </p:txBody>
+      </p:sp>
+      <p:sp>
+        <p:nvSpPr>
+          <p:cNvPr id="4" name="Slide Number Placeholder 3"/>
+          <p:cNvSpPr>
+            <a:spLocks noGrp="1"/>
+          </p:cNvSpPr>
+          <p:nvPr>
+            <p:ph type="sldNum" sz="quarter" idx="10"/>
+          </p:nvPr>
+        </p:nvSpPr>
+        <p:spPr/>
+        <p:txBody>
+          <a:bodyPr/>
+          <a:lstStyle/>
+          <a:p>
+            <a:fld id="{40865DB0-5429-4151-A52D-1926E4CCAC76}" type="slidenum">
+              <a:rPr lang="en-US" smtClean="0"/>
+              <a:t>8</a:t>
+            </a:fld>
+            <a:endParaRPr lang="en-US"/>
+          </a:p>
+        </p:txBody>
+      </p:sp>
+    </p:spTree>
+    <p:extLst>
+      <p:ext uri="{BB962C8B-B14F-4D97-AF65-F5344CB8AC3E}">
+        <p14:creationId xmlns:p14="http://schemas.microsoft.com/office/powerpoint/2010/main" val="532013913"/>
+      </p:ext>
+    </p:extLst>
+  </p:cSld>
+  <p:clrMapOvr>
+    <a:masterClrMapping/>
+  </p:clrMapOvr>
+</p:notes>
+</file>
+
+<file path=ppt/notesSlides/notesSlide8.xml><?xml version="1.0" encoding="utf-8"?>
+<p:notes xmlns:a="http://schemas.openxmlformats.org/drawingml/2006/main" xmlns:r="http://schemas.openxmlformats.org/officeDocument/2006/relationships" xmlns:p="http://schemas.openxmlformats.org/presentationml/2006/main">
+  <p:cSld>
+    <p:spTree>
+      <p:nvGrpSpPr>
+        <p:cNvPr id="1" name=""/>
+        <p:cNvGrpSpPr/>
+        <p:nvPr/>
+      </p:nvGrpSpPr>
+      <p:grpSpPr>
+        <a:xfrm>
+          <a:off x="0" y="0"/>
+          <a:ext cx="0" cy="0"/>
+          <a:chOff x="0" y="0"/>
+          <a:chExt cx="0" cy="0"/>
+        </a:xfrm>
+      </p:grpSpPr>
+      <p:sp>
+        <p:nvSpPr>
+          <p:cNvPr id="2" name="Slide Image Placeholder 1"/>
+          <p:cNvSpPr>
+            <a:spLocks noGrp="1" noRot="1" noChangeAspect="1"/>
+          </p:cNvSpPr>
+          <p:nvPr>
+            <p:ph type="sldImg"/>
+          </p:nvPr>
+        </p:nvSpPr>
+        <p:spPr/>
+      </p:sp>
+      <p:sp>
+        <p:nvSpPr>
+          <p:cNvPr id="3" name="Notes Placeholder 2"/>
+          <p:cNvSpPr>
+            <a:spLocks noGrp="1"/>
+          </p:cNvSpPr>
+          <p:nvPr>
+            <p:ph type="body" idx="1"/>
+          </p:nvPr>
+        </p:nvSpPr>
+        <p:spPr/>
+        <p:txBody>
+          <a:bodyPr/>
+          <a:lstStyle/>
+          <a:p>
+            <a:r>
+              <a:rPr lang="en-US" dirty="0" smtClean="0"/>
+              <a:t>Now</a:t>
+            </a:r>
+            <a:r>
+              <a:rPr lang="en-US" baseline="0" dirty="0" smtClean="0"/>
+              <a:t> let’s run our OR gate example through this MLP and see how it works. First we input the True and False values, remembering to convert them to 1 and -1 respectively.</a:t>
+            </a:r>
+            <a:endParaRPr lang="en-US" dirty="0"/>
+          </a:p>
+        </p:txBody>
+      </p:sp>
+      <p:sp>
+        <p:nvSpPr>
+          <p:cNvPr id="4" name="Slide Number Placeholder 3"/>
+          <p:cNvSpPr>
+            <a:spLocks noGrp="1"/>
+          </p:cNvSpPr>
+          <p:nvPr>
+            <p:ph type="sldNum" sz="quarter" idx="10"/>
+          </p:nvPr>
+        </p:nvSpPr>
+        <p:spPr/>
+        <p:txBody>
+          <a:bodyPr/>
+          <a:lstStyle/>
+          <a:p>
+            <a:fld id="{40865DB0-5429-4151-A52D-1926E4CCAC76}" type="slidenum">
+              <a:rPr lang="en-US" smtClean="0"/>
+              <a:t>9</a:t>
+            </a:fld>
+            <a:endParaRPr lang="en-US"/>
+          </a:p>
+        </p:txBody>
+      </p:sp>
+    </p:spTree>
+    <p:extLst>
+      <p:ext uri="{BB962C8B-B14F-4D97-AF65-F5344CB8AC3E}">
+        <p14:creationId xmlns:p14="http://schemas.microsoft.com/office/powerpoint/2010/main" val="3811185163"/>
+      </p:ext>
+    </p:extLst>
+  </p:cSld>
+  <p:clrMapOvr>
+    <a:masterClrMapping/>
+  </p:clrMapOvr>
+</p:notes>
+</file>
+
+<file path=ppt/notesSlides/notesSlide9.xml><?xml version="1.0" encoding="utf-8"?>
+<p:notes xmlns:a="http://schemas.openxmlformats.org/drawingml/2006/main" xmlns:r="http://schemas.openxmlformats.org/officeDocument/2006/relationships" xmlns:p="http://schemas.openxmlformats.org/presentationml/2006/main">
+  <p:cSld>
+    <p:spTree>
+      <p:nvGrpSpPr>
+        <p:cNvPr id="1" name=""/>
+        <p:cNvGrpSpPr/>
+        <p:nvPr/>
+      </p:nvGrpSpPr>
+      <p:grpSpPr>
+        <a:xfrm>
+          <a:off x="0" y="0"/>
+          <a:ext cx="0" cy="0"/>
+          <a:chOff x="0" y="0"/>
+          <a:chExt cx="0" cy="0"/>
+        </a:xfrm>
+      </p:grpSpPr>
+      <p:sp>
+        <p:nvSpPr>
+          <p:cNvPr id="2" name="Slide Image Placeholder 1"/>
+          <p:cNvSpPr>
+            <a:spLocks noGrp="1" noRot="1" noChangeAspect="1"/>
+          </p:cNvSpPr>
+          <p:nvPr>
+            <p:ph type="sldImg"/>
+          </p:nvPr>
+        </p:nvSpPr>
+        <p:spPr/>
+      </p:sp>
+      <p:sp>
+        <p:nvSpPr>
+          <p:cNvPr id="3" name="Notes Placeholder 2"/>
+          <p:cNvSpPr>
+            <a:spLocks noGrp="1"/>
+          </p:cNvSpPr>
+          <p:nvPr>
+            <p:ph type="body" idx="1"/>
+          </p:nvPr>
+        </p:nvSpPr>
+        <p:spPr/>
+        <p:txBody>
+          <a:bodyPr/>
+          <a:lstStyle/>
+          <a:p>
+            <a:r>
+              <a:rPr lang="en-US" dirty="0" smtClean="0"/>
+              <a:t>Now,</a:t>
+            </a:r>
+            <a:r>
+              <a:rPr lang="en-US" baseline="0" dirty="0" smtClean="0"/>
+              <a:t> we send each input node value to every hidden layer node, as dictated by the statistical weight errors. They are combined to produce whatever numbers end up in the hidden layer. Remember, these values are known internally to the ANN, but you don’t care what they are – they’re hidden from you.</a:t>
+            </a:r>
+            <a:endParaRPr lang="en-US" dirty="0"/>
+          </a:p>
+        </p:txBody>
+      </p:sp>
+      <p:sp>
+        <p:nvSpPr>
+          <p:cNvPr id="4" name="Slide Number Placeholder 3"/>
+          <p:cNvSpPr>
+            <a:spLocks noGrp="1"/>
+          </p:cNvSpPr>
+          <p:nvPr>
+            <p:ph type="sldNum" sz="quarter" idx="10"/>
+          </p:nvPr>
+        </p:nvSpPr>
+        <p:spPr/>
+        <p:txBody>
+          <a:bodyPr/>
+          <a:lstStyle/>
+          <a:p>
+            <a:fld id="{40865DB0-5429-4151-A52D-1926E4CCAC76}" type="slidenum">
+              <a:rPr lang="en-US" smtClean="0"/>
+              <a:t>10</a:t>
+            </a:fld>
+            <a:endParaRPr lang="en-US"/>
+          </a:p>
+        </p:txBody>
+      </p:sp>
+    </p:spTree>
+    <p:extLst>
+      <p:ext uri="{BB962C8B-B14F-4D97-AF65-F5344CB8AC3E}">
+        <p14:creationId xmlns:p14="http://schemas.microsoft.com/office/powerpoint/2010/main" val="3526828391"/>
       </p:ext>
     </p:extLst>
   </p:cSld>
@@ -757,7 +2192,7 @@
           <a:p>
             <a:fld id="{BC21CBC7-684E-4217-84FB-780827C911D5}" type="datetimeFigureOut">
               <a:rPr lang="en-US" smtClean="0"/>
-              <a:t>12/12/2015</a:t>
+              <a:t>12/13/2015</a:t>
             </a:fld>
             <a:endParaRPr lang="en-US"/>
           </a:p>
@@ -927,7 +2362,7 @@
           <a:p>
             <a:fld id="{BC21CBC7-684E-4217-84FB-780827C911D5}" type="datetimeFigureOut">
               <a:rPr lang="en-US" smtClean="0"/>
-              <a:t>12/12/2015</a:t>
+              <a:t>12/13/2015</a:t>
             </a:fld>
             <a:endParaRPr lang="en-US"/>
           </a:p>
@@ -1107,7 +2542,7 @@
           <a:p>
             <a:fld id="{BC21CBC7-684E-4217-84FB-780827C911D5}" type="datetimeFigureOut">
               <a:rPr lang="en-US" smtClean="0"/>
-              <a:t>12/12/2015</a:t>
+              <a:t>12/13/2015</a:t>
             </a:fld>
             <a:endParaRPr lang="en-US"/>
           </a:p>
@@ -1448,7 +2883,7 @@
           <a:p>
             <a:fld id="{BC21CBC7-684E-4217-84FB-780827C911D5}" type="datetimeFigureOut">
               <a:rPr lang="en-US" smtClean="0"/>
-              <a:t>12/12/2015</a:t>
+              <a:t>12/13/2015</a:t>
             </a:fld>
             <a:endParaRPr lang="en-US"/>
           </a:p>
@@ -1799,7 +3234,7 @@
           <a:p>
             <a:fld id="{BC21CBC7-684E-4217-84FB-780827C911D5}" type="datetimeFigureOut">
               <a:rPr lang="en-US" smtClean="0"/>
-              <a:t>12/12/2015</a:t>
+              <a:t>12/13/2015</a:t>
             </a:fld>
             <a:endParaRPr lang="en-US"/>
           </a:p>
@@ -2342,7 +3777,7 @@
           <a:p>
             <a:fld id="{BC21CBC7-684E-4217-84FB-780827C911D5}" type="datetimeFigureOut">
               <a:rPr lang="en-US" smtClean="0"/>
-              <a:t>12/12/2015</a:t>
+              <a:t>12/13/2015</a:t>
             </a:fld>
             <a:endParaRPr lang="en-US"/>
           </a:p>
@@ -2637,7 +4072,7 @@
           <a:p>
             <a:fld id="{BC21CBC7-684E-4217-84FB-780827C911D5}" type="datetimeFigureOut">
               <a:rPr lang="en-US" smtClean="0"/>
-              <a:t>12/12/2015</a:t>
+              <a:t>12/13/2015</a:t>
             </a:fld>
             <a:endParaRPr lang="en-US"/>
           </a:p>
@@ -3296,7 +4731,7 @@
           <a:p>
             <a:fld id="{BC21CBC7-684E-4217-84FB-780827C911D5}" type="datetimeFigureOut">
               <a:rPr lang="en-US" smtClean="0"/>
-              <a:t>12/12/2015</a:t>
+              <a:t>12/13/2015</a:t>
             </a:fld>
             <a:endParaRPr lang="en-US"/>
           </a:p>
@@ -3732,7 +5167,7 @@
           <a:p>
             <a:fld id="{BC21CBC7-684E-4217-84FB-780827C911D5}" type="datetimeFigureOut">
               <a:rPr lang="en-US" smtClean="0"/>
-              <a:t>12/12/2015</a:t>
+              <a:t>12/13/2015</a:t>
             </a:fld>
             <a:endParaRPr lang="en-US"/>
           </a:p>
@@ -4045,7 +5480,7 @@
           <a:p>
             <a:fld id="{BC21CBC7-684E-4217-84FB-780827C911D5}" type="datetimeFigureOut">
               <a:rPr lang="en-US" smtClean="0"/>
-              <a:t>12/12/2015</a:t>
+              <a:t>12/13/2015</a:t>
             </a:fld>
             <a:endParaRPr lang="en-US"/>
           </a:p>
@@ -4777,7 +6212,7 @@
           <a:p>
             <a:fld id="{BC21CBC7-684E-4217-84FB-780827C911D5}" type="datetimeFigureOut">
               <a:rPr lang="en-US" smtClean="0"/>
-              <a:t>12/12/2015</a:t>
+              <a:t>12/13/2015</a:t>
             </a:fld>
             <a:endParaRPr lang="en-US"/>
           </a:p>
@@ -4924,7 +6359,7 @@
           <a:p>
             <a:fld id="{BC21CBC7-684E-4217-84FB-780827C911D5}" type="datetimeFigureOut">
               <a:rPr lang="en-US" smtClean="0"/>
-              <a:t>12/12/2015</a:t>
+              <a:t>12/13/2015</a:t>
             </a:fld>
             <a:endParaRPr lang="en-US"/>
           </a:p>
@@ -5611,7 +7046,7 @@
           <a:p>
             <a:fld id="{BC21CBC7-684E-4217-84FB-780827C911D5}" type="datetimeFigureOut">
               <a:rPr lang="en-US" smtClean="0"/>
-              <a:t>12/12/2015</a:t>
+              <a:t>12/13/2015</a:t>
             </a:fld>
             <a:endParaRPr lang="en-US"/>
           </a:p>
@@ -5763,7 +7198,7 @@
           <a:p>
             <a:fld id="{BC21CBC7-684E-4217-84FB-780827C911D5}" type="datetimeFigureOut">
               <a:rPr lang="en-US" smtClean="0"/>
-              <a:t>12/12/2015</a:t>
+              <a:t>12/13/2015</a:t>
             </a:fld>
             <a:endParaRPr lang="en-US"/>
           </a:p>
@@ -6295,7 +7730,7 @@
           <a:p>
             <a:fld id="{BC21CBC7-684E-4217-84FB-780827C911D5}" type="datetimeFigureOut">
               <a:rPr lang="en-US" smtClean="0"/>
-              <a:t>12/12/2015</a:t>
+              <a:t>12/13/2015</a:t>
             </a:fld>
             <a:endParaRPr lang="en-US"/>
           </a:p>
@@ -6541,7 +7976,7 @@
           <a:p>
             <a:fld id="{BC21CBC7-684E-4217-84FB-780827C911D5}" type="datetimeFigureOut">
               <a:rPr lang="en-US" smtClean="0"/>
-              <a:t>12/12/2015</a:t>
+              <a:t>12/13/2015</a:t>
             </a:fld>
             <a:endParaRPr lang="en-US"/>
           </a:p>
@@ -6829,7 +8264,7 @@
           <a:p>
             <a:fld id="{BC21CBC7-684E-4217-84FB-780827C911D5}" type="datetimeFigureOut">
               <a:rPr lang="en-US" smtClean="0"/>
-              <a:t>12/12/2015</a:t>
+              <a:t>12/13/2015</a:t>
             </a:fld>
             <a:endParaRPr lang="en-US"/>
           </a:p>
@@ -7251,7 +8686,7 @@
           <a:p>
             <a:fld id="{BC21CBC7-684E-4217-84FB-780827C911D5}" type="datetimeFigureOut">
               <a:rPr lang="en-US" smtClean="0"/>
-              <a:t>12/12/2015</a:t>
+              <a:t>12/13/2015</a:t>
             </a:fld>
             <a:endParaRPr lang="en-US"/>
           </a:p>
@@ -7369,7 +8804,7 @@
           <a:p>
             <a:fld id="{BC21CBC7-684E-4217-84FB-780827C911D5}" type="datetimeFigureOut">
               <a:rPr lang="en-US" smtClean="0"/>
-              <a:t>12/12/2015</a:t>
+              <a:t>12/13/2015</a:t>
             </a:fld>
             <a:endParaRPr lang="en-US"/>
           </a:p>
@@ -7464,7 +8899,7 @@
           <a:p>
             <a:fld id="{BC21CBC7-684E-4217-84FB-780827C911D5}" type="datetimeFigureOut">
               <a:rPr lang="en-US" smtClean="0"/>
-              <a:t>12/12/2015</a:t>
+              <a:t>12/13/2015</a:t>
             </a:fld>
             <a:endParaRPr lang="en-US"/>
           </a:p>
@@ -7741,7 +9176,7 @@
           <a:p>
             <a:fld id="{BC21CBC7-684E-4217-84FB-780827C911D5}" type="datetimeFigureOut">
               <a:rPr lang="en-US" smtClean="0"/>
-              <a:t>12/12/2015</a:t>
+              <a:t>12/13/2015</a:t>
             </a:fld>
             <a:endParaRPr lang="en-US"/>
           </a:p>
@@ -7994,7 +9429,7 @@
           <a:p>
             <a:fld id="{BC21CBC7-684E-4217-84FB-780827C911D5}" type="datetimeFigureOut">
               <a:rPr lang="en-US" smtClean="0"/>
-              <a:t>12/12/2015</a:t>
+              <a:t>12/13/2015</a:t>
             </a:fld>
             <a:endParaRPr lang="en-US"/>
           </a:p>
@@ -8207,7 +9642,7 @@
           <a:p>
             <a:fld id="{BC21CBC7-684E-4217-84FB-780827C911D5}" type="datetimeFigureOut">
               <a:rPr lang="en-US" smtClean="0"/>
-              <a:t>12/12/2015</a:t>
+              <a:t>12/13/2015</a:t>
             </a:fld>
             <a:endParaRPr lang="en-US"/>
           </a:p>
@@ -8800,7 +10235,7 @@
           <a:p>
             <a:fld id="{BC21CBC7-684E-4217-84FB-780827C911D5}" type="datetimeFigureOut">
               <a:rPr lang="en-US" smtClean="0"/>
-              <a:t>12/12/2015</a:t>
+              <a:t>12/13/2015</a:t>
             </a:fld>
             <a:endParaRPr lang="en-US"/>
           </a:p>
@@ -20045,8 +21480,8 @@
           </a:p>
         </p:txBody>
       </p:sp>
-      <mc:AlternateContent xmlns:mc="http://schemas.openxmlformats.org/markup-compatibility/2006">
-        <mc:Choice xmlns:a14="http://schemas.microsoft.com/office/drawing/2010/main" Requires="a14">
+      <mc:AlternateContent xmlns:mc="http://schemas.openxmlformats.org/markup-compatibility/2006" xmlns:a14="http://schemas.microsoft.com/office/drawing/2010/main">
+        <mc:Choice Requires="a14">
           <p:sp>
             <p:nvSpPr>
               <p:cNvPr id="2" name="TextBox 1"/>
@@ -20126,13 +21561,7 @@
                             <a:rPr lang="en-US" b="0" i="1" smtClean="0">
                               <a:latin typeface="Cambria Math" panose="02040503050406030204" pitchFamily="18" charset="0"/>
                             </a:rPr>
-                            <m:t>1</m:t>
-                          </m:r>
-                          <m:r>
-                            <a:rPr lang="en-US" b="0" i="1" smtClean="0">
-                              <a:latin typeface="Cambria Math" panose="02040503050406030204" pitchFamily="18" charset="0"/>
-                            </a:rPr>
-                            <m:t>+</m:t>
+                            <m:t>1+</m:t>
                           </m:r>
                           <m:sSup>
                             <m:sSupPr>
@@ -20175,7 +21604,7 @@
             </p:txBody>
           </p:sp>
         </mc:Choice>
-        <mc:Fallback>
+        <mc:Fallback xmlns="">
           <p:sp>
             <p:nvSpPr>
               <p:cNvPr id="2" name="TextBox 1"/>
@@ -20193,7 +21622,7 @@
                 <a:avLst/>
               </a:prstGeom>
               <a:blipFill rotWithShape="0">
-                <a:blip r:embed="rId2"/>
+                <a:blip r:embed="rId3"/>
                 <a:stretch>
                   <a:fillRect/>
                 </a:stretch>
@@ -25321,7 +26750,7 @@
           </a:lstStyle>
           <a:p>
             <a:r>
-              <a:rPr lang="en-US" dirty="0" err="1" smtClean="0">
+              <a:rPr lang="en-US" dirty="0" smtClean="0">
                 <a:solidFill>
                   <a:schemeClr val="bg1"/>
                 </a:solidFill>
@@ -25336,7 +26765,7 @@
                 <a:ea typeface="Verdana" pitchFamily="34" charset="0"/>
                 <a:cs typeface="Verdana" pitchFamily="34" charset="0"/>
               </a:rPr>
-              <a:t>Perceptrons</a:t>
+              <a:t>Logic Gates</a:t>
             </a:r>
             <a:endParaRPr lang="en-US" dirty="0">
               <a:solidFill>
@@ -29874,53 +31303,6 @@
                   </a:srgbClr>
                 </a:outerShdw>
               </a:effectLst>
-              <a:latin typeface="Verdana" pitchFamily="34" charset="0"/>
-              <a:ea typeface="Verdana" pitchFamily="34" charset="0"/>
-              <a:cs typeface="Verdana" pitchFamily="34" charset="0"/>
-            </a:endParaRPr>
-          </a:p>
-        </p:txBody>
-      </p:sp>
-      <p:sp>
-        <p:nvSpPr>
-          <p:cNvPr id="55" name="TextBox 54"/>
-          <p:cNvSpPr txBox="1"/>
-          <p:nvPr/>
-        </p:nvSpPr>
-        <p:spPr>
-          <a:xfrm>
-            <a:off x="189494" y="1601752"/>
-            <a:ext cx="1892779" cy="523220"/>
-          </a:xfrm>
-          <a:prstGeom prst="rect">
-            <a:avLst/>
-          </a:prstGeom>
-          <a:noFill/>
-          <a:ln w="38100">
-            <a:solidFill>
-              <a:schemeClr val="tx1">
-                <a:lumMod val="50000"/>
-                <a:lumOff val="50000"/>
-              </a:schemeClr>
-            </a:solidFill>
-          </a:ln>
-        </p:spPr>
-        <p:txBody>
-          <a:bodyPr wrap="square" rtlCol="0">
-            <a:spAutoFit/>
-          </a:bodyPr>
-          <a:lstStyle/>
-          <a:p>
-            <a:pPr algn="ctr"/>
-            <a:r>
-              <a:rPr lang="en-US" sz="2800" dirty="0" smtClean="0">
-                <a:latin typeface="Verdana" pitchFamily="34" charset="0"/>
-                <a:ea typeface="Verdana" pitchFamily="34" charset="0"/>
-                <a:cs typeface="Verdana" pitchFamily="34" charset="0"/>
-              </a:rPr>
-              <a:t>OR-gate</a:t>
-            </a:r>
-            <a:endParaRPr lang="en-US" sz="2800" dirty="0">
               <a:latin typeface="Verdana" pitchFamily="34" charset="0"/>
               <a:ea typeface="Verdana" pitchFamily="34" charset="0"/>
               <a:cs typeface="Verdana" pitchFamily="34" charset="0"/>

</xml_diff>